<commit_message>
fix: Adjust Menti.com code on the Recursion slides
</commit_message>
<xml_diff>
--- a/source/recursion/_static/linked_list/linked_lists.pptx
+++ b/source/recursion/_static/linked_list/linked_lists.pptx
@@ -782,7 +782,7 @@
           <a:p>
             <a:fld id="{7575928B-B84D-AD46-A043-C234B7E6F0B4}" type="datetimeFigureOut">
               <a:rPr lang="en-NO" smtClean="0"/>
-              <a:t>17/09/2023</a:t>
+              <a:t>18/09/2023</a:t>
             </a:fld>
             <a:endParaRPr lang="en-NO"/>
           </a:p>
@@ -990,7 +990,7 @@
           <a:p>
             <a:fld id="{7575928B-B84D-AD46-A043-C234B7E6F0B4}" type="datetimeFigureOut">
               <a:rPr lang="en-NO" smtClean="0"/>
-              <a:t>17/09/2023</a:t>
+              <a:t>18/09/2023</a:t>
             </a:fld>
             <a:endParaRPr lang="en-NO"/>
           </a:p>
@@ -1208,7 +1208,7 @@
           <a:p>
             <a:fld id="{7575928B-B84D-AD46-A043-C234B7E6F0B4}" type="datetimeFigureOut">
               <a:rPr lang="en-NO" smtClean="0"/>
-              <a:t>17/09/2023</a:t>
+              <a:t>18/09/2023</a:t>
             </a:fld>
             <a:endParaRPr lang="en-NO"/>
           </a:p>
@@ -1925,7 +1925,7 @@
           <a:p>
             <a:fld id="{7575928B-B84D-AD46-A043-C234B7E6F0B4}" type="datetimeFigureOut">
               <a:rPr lang="en-NO" smtClean="0"/>
-              <a:t>17/09/2023</a:t>
+              <a:t>18/09/2023</a:t>
             </a:fld>
             <a:endParaRPr lang="en-NO"/>
           </a:p>
@@ -2201,7 +2201,7 @@
           <a:p>
             <a:fld id="{7575928B-B84D-AD46-A043-C234B7E6F0B4}" type="datetimeFigureOut">
               <a:rPr lang="en-NO" smtClean="0"/>
-              <a:t>17/09/2023</a:t>
+              <a:t>18/09/2023</a:t>
             </a:fld>
             <a:endParaRPr lang="en-NO"/>
           </a:p>
@@ -2624,7 +2624,7 @@
           <a:p>
             <a:fld id="{7575928B-B84D-AD46-A043-C234B7E6F0B4}" type="datetimeFigureOut">
               <a:rPr lang="en-NO" smtClean="0"/>
-              <a:t>17/09/2023</a:t>
+              <a:t>18/09/2023</a:t>
             </a:fld>
             <a:endParaRPr lang="en-NO"/>
           </a:p>
@@ -2774,7 +2774,7 @@
           <a:p>
             <a:fld id="{7575928B-B84D-AD46-A043-C234B7E6F0B4}" type="datetimeFigureOut">
               <a:rPr lang="en-NO" smtClean="0"/>
-              <a:t>17/09/2023</a:t>
+              <a:t>18/09/2023</a:t>
             </a:fld>
             <a:endParaRPr lang="en-NO"/>
           </a:p>
@@ -2895,7 +2895,7 @@
           <a:p>
             <a:fld id="{7575928B-B84D-AD46-A043-C234B7E6F0B4}" type="datetimeFigureOut">
               <a:rPr lang="en-NO" smtClean="0"/>
-              <a:t>17/09/2023</a:t>
+              <a:t>18/09/2023</a:t>
             </a:fld>
             <a:endParaRPr lang="en-NO"/>
           </a:p>
@@ -3216,7 +3216,7 @@
           <a:p>
             <a:fld id="{7575928B-B84D-AD46-A043-C234B7E6F0B4}" type="datetimeFigureOut">
               <a:rPr lang="en-NO" smtClean="0"/>
-              <a:t>17/09/2023</a:t>
+              <a:t>18/09/2023</a:t>
             </a:fld>
             <a:endParaRPr lang="en-NO"/>
           </a:p>
@@ -4007,6 +4007,121 @@
           </a:p>
         </p:txBody>
       </p:sp>
+      <p:sp>
+        <p:nvSpPr>
+          <p:cNvPr id="8" name="TextBox 7">
+            <a:extLst>
+              <a:ext uri="{FF2B5EF4-FFF2-40B4-BE49-F238E27FC236}">
+                <a16:creationId xmlns:a16="http://schemas.microsoft.com/office/drawing/2014/main" id="{F4FD1B0D-00C8-2B13-0109-A6F45387BB9F}"/>
+              </a:ext>
+            </a:extLst>
+          </p:cNvPr>
+          <p:cNvSpPr txBox="1"/>
+          <p:nvPr/>
+        </p:nvSpPr>
+        <p:spPr>
+          <a:xfrm>
+            <a:off x="8059774" y="5593892"/>
+            <a:ext cx="3584636" cy="646331"/>
+          </a:xfrm>
+          <a:prstGeom prst="rect">
+            <a:avLst/>
+          </a:prstGeom>
+          <a:noFill/>
+        </p:spPr>
+        <p:txBody>
+          <a:bodyPr wrap="none" rtlCol="0">
+            <a:spAutoFit/>
+          </a:bodyPr>
+          <a:lstStyle/>
+          <a:p>
+            <a:pPr algn="r"/>
+            <a:r>
+              <a:rPr lang="en-GB" b="0" i="0" dirty="0">
+                <a:solidFill>
+                  <a:schemeClr val="accent6"/>
+                </a:solidFill>
+                <a:effectLst/>
+                <a:latin typeface="Montserrat" pitchFamily="2" charset="77"/>
+              </a:rPr>
+              <a:t>Ask </a:t>
+            </a:r>
+            <a:r>
+              <a:rPr lang="en-GB" dirty="0">
+                <a:solidFill>
+                  <a:schemeClr val="accent6"/>
+                </a:solidFill>
+                <a:latin typeface="Montserrat" pitchFamily="2" charset="77"/>
+              </a:rPr>
+              <a:t>questions on </a:t>
+            </a:r>
+            <a:r>
+              <a:rPr lang="en-GB" b="1" i="0" dirty="0" err="1">
+                <a:solidFill>
+                  <a:schemeClr val="accent6"/>
+                </a:solidFill>
+                <a:effectLst/>
+                <a:latin typeface="Montserrat" pitchFamily="2" charset="77"/>
+              </a:rPr>
+              <a:t>menti.com</a:t>
+            </a:r>
+            <a:r>
+              <a:rPr lang="en-GB" b="0" i="0" dirty="0">
+                <a:solidFill>
+                  <a:schemeClr val="accent6"/>
+                </a:solidFill>
+                <a:effectLst/>
+                <a:latin typeface="Montserrat" pitchFamily="2" charset="77"/>
+              </a:rPr>
+              <a:t> </a:t>
+            </a:r>
+            <a:br>
+              <a:rPr lang="en-GB" b="0" i="0" dirty="0">
+                <a:solidFill>
+                  <a:schemeClr val="accent6"/>
+                </a:solidFill>
+                <a:effectLst/>
+                <a:latin typeface="Montserrat" pitchFamily="2" charset="77"/>
+              </a:rPr>
+            </a:br>
+            <a:r>
+              <a:rPr lang="en-GB" dirty="0">
+                <a:solidFill>
+                  <a:schemeClr val="accent6"/>
+                </a:solidFill>
+                <a:latin typeface="Montserrat" pitchFamily="2" charset="77"/>
+              </a:rPr>
+              <a:t>with</a:t>
+            </a:r>
+            <a:r>
+              <a:rPr lang="en-GB" b="0" i="0" dirty="0">
+                <a:solidFill>
+                  <a:schemeClr val="accent6"/>
+                </a:solidFill>
+                <a:effectLst/>
+                <a:latin typeface="Montserrat" pitchFamily="2" charset="77"/>
+              </a:rPr>
+              <a:t> the code </a:t>
+            </a:r>
+            <a:r>
+              <a:rPr lang="en-GB" b="1" i="0" dirty="0">
+                <a:solidFill>
+                  <a:schemeClr val="accent6"/>
+                </a:solidFill>
+                <a:effectLst/>
+                <a:latin typeface="Montserrat" pitchFamily="2" charset="77"/>
+              </a:rPr>
+              <a:t> 1727 7990</a:t>
+            </a:r>
+            <a:endParaRPr lang="en-NO" dirty="0">
+              <a:solidFill>
+                <a:schemeClr val="accent6"/>
+              </a:solidFill>
+              <a:latin typeface="Montserrat" pitchFamily="2" charset="77"/>
+            </a:endParaRPr>
+          </a:p>
+        </p:txBody>
+      </p:sp>
     </p:spTree>
     <p:extLst>
       <p:ext uri="{BB962C8B-B14F-4D97-AF65-F5344CB8AC3E}">
@@ -14465,8 +14580,8 @@
           </a:p>
         </p:txBody>
       </p:sp>
-      <mc:AlternateContent xmlns:mc="http://schemas.openxmlformats.org/markup-compatibility/2006">
-        <mc:Choice xmlns:a14="http://schemas.microsoft.com/office/drawing/2010/main" Requires="a14">
+      <mc:AlternateContent xmlns:mc="http://schemas.openxmlformats.org/markup-compatibility/2006" xmlns:a14="http://schemas.microsoft.com/office/drawing/2010/main">
+        <mc:Choice Requires="a14">
           <p:sp>
             <p:nvSpPr>
               <p:cNvPr id="5" name="TextBox 4">
@@ -14578,7 +14693,7 @@
             </p:txBody>
           </p:sp>
         </mc:Choice>
-        <mc:Fallback>
+        <mc:Fallback xmlns="">
           <p:sp>
             <p:nvSpPr>
               <p:cNvPr id="5" name="TextBox 4">
@@ -14758,8 +14873,8 @@
           </a:p>
         </p:txBody>
       </p:sp>
-      <mc:AlternateContent xmlns:mc="http://schemas.openxmlformats.org/markup-compatibility/2006">
-        <mc:Choice xmlns:a14="http://schemas.microsoft.com/office/drawing/2010/main" Requires="a14">
+      <mc:AlternateContent xmlns:mc="http://schemas.openxmlformats.org/markup-compatibility/2006" xmlns:a14="http://schemas.microsoft.com/office/drawing/2010/main">
+        <mc:Choice Requires="a14">
           <p:sp>
             <p:nvSpPr>
               <p:cNvPr id="5" name="TextBox 4">
@@ -14828,7 +14943,7 @@
             </p:txBody>
           </p:sp>
         </mc:Choice>
-        <mc:Fallback>
+        <mc:Fallback xmlns="">
           <p:sp>
             <p:nvSpPr>
               <p:cNvPr id="5" name="TextBox 4">
@@ -25554,8 +25669,8 @@
           </a:p>
         </p:txBody>
       </p:sp>
-      <mc:AlternateContent xmlns:mc="http://schemas.openxmlformats.org/markup-compatibility/2006">
-        <mc:Choice xmlns:a14="http://schemas.microsoft.com/office/drawing/2010/main" Requires="a14">
+      <mc:AlternateContent xmlns:mc="http://schemas.openxmlformats.org/markup-compatibility/2006" xmlns:a14="http://schemas.microsoft.com/office/drawing/2010/main">
+        <mc:Choice Requires="a14">
           <p:graphicFrame>
             <p:nvGraphicFramePr>
               <p:cNvPr id="3" name="Table 3">
@@ -25996,6 +26111,7 @@
                         <a:bodyPr/>
                         <a:lstStyle/>
                         <a:p>
+                          <a:pPr/>
                           <a14:m>
                             <m:oMathPara xmlns:m="http://schemas.openxmlformats.org/officeDocument/2006/math">
                               <m:oMathParaPr>
@@ -27645,7 +27761,7 @@
             </a:graphic>
           </p:graphicFrame>
         </mc:Choice>
-        <mc:Fallback>
+        <mc:Fallback xmlns="">
           <p:graphicFrame>
             <p:nvGraphicFramePr>
               <p:cNvPr id="3" name="Table 3">
@@ -31785,8 +31901,8 @@
           </a:p>
         </p:txBody>
       </p:sp>
-      <mc:AlternateContent xmlns:mc="http://schemas.openxmlformats.org/markup-compatibility/2006">
-        <mc:Choice xmlns:a14="http://schemas.microsoft.com/office/drawing/2010/main" Requires="a14">
+      <mc:AlternateContent xmlns:mc="http://schemas.openxmlformats.org/markup-compatibility/2006" xmlns:a14="http://schemas.microsoft.com/office/drawing/2010/main">
+        <mc:Choice Requires="a14">
           <p:sp>
             <p:nvSpPr>
               <p:cNvPr id="5" name="Content Placeholder 4">
@@ -31964,7 +32080,7 @@
             </p:txBody>
           </p:sp>
         </mc:Choice>
-        <mc:Fallback>
+        <mc:Fallback xmlns="">
           <p:sp>
             <p:nvSpPr>
               <p:cNvPr id="5" name="Content Placeholder 4">

</xml_diff>